<commit_message>
probably finally fix web export sizing issue
</commit_message>
<xml_diff>
--- a/Assets/PPAssets.pptx
+++ b/Assets/PPAssets.pptx
@@ -104,6 +104,11 @@
       </a:defRPr>
     </a:lvl9pPr>
   </p:defaultTextStyle>
+  <p:extLst>
+    <p:ext uri="{EFAFB233-063F-42B5-8137-9DF3F51BA10A}">
+      <p15:sldGuideLst xmlns:p15="http://schemas.microsoft.com/office/powerpoint/2012/main"/>
+    </p:ext>
+  </p:extLst>
 </p:presentation>
 </file>
 
@@ -256,7 +261,7 @@
           <a:p>
             <a:fld id="{53E5EB77-C26E-4EBD-A5F2-B8063B5F6528}" type="datetimeFigureOut">
               <a:rPr lang="en-GB" smtClean="0"/>
-              <a:t>27/06/2021</a:t>
+              <a:t>04/07/2021</a:t>
             </a:fld>
             <a:endParaRPr lang="en-GB"/>
           </a:p>
@@ -456,7 +461,7 @@
           <a:p>
             <a:fld id="{53E5EB77-C26E-4EBD-A5F2-B8063B5F6528}" type="datetimeFigureOut">
               <a:rPr lang="en-GB" smtClean="0"/>
-              <a:t>27/06/2021</a:t>
+              <a:t>04/07/2021</a:t>
             </a:fld>
             <a:endParaRPr lang="en-GB"/>
           </a:p>
@@ -666,7 +671,7 @@
           <a:p>
             <a:fld id="{53E5EB77-C26E-4EBD-A5F2-B8063B5F6528}" type="datetimeFigureOut">
               <a:rPr lang="en-GB" smtClean="0"/>
-              <a:t>27/06/2021</a:t>
+              <a:t>04/07/2021</a:t>
             </a:fld>
             <a:endParaRPr lang="en-GB"/>
           </a:p>
@@ -866,7 +871,7 @@
           <a:p>
             <a:fld id="{53E5EB77-C26E-4EBD-A5F2-B8063B5F6528}" type="datetimeFigureOut">
               <a:rPr lang="en-GB" smtClean="0"/>
-              <a:t>27/06/2021</a:t>
+              <a:t>04/07/2021</a:t>
             </a:fld>
             <a:endParaRPr lang="en-GB"/>
           </a:p>
@@ -1142,7 +1147,7 @@
           <a:p>
             <a:fld id="{53E5EB77-C26E-4EBD-A5F2-B8063B5F6528}" type="datetimeFigureOut">
               <a:rPr lang="en-GB" smtClean="0"/>
-              <a:t>27/06/2021</a:t>
+              <a:t>04/07/2021</a:t>
             </a:fld>
             <a:endParaRPr lang="en-GB"/>
           </a:p>
@@ -1410,7 +1415,7 @@
           <a:p>
             <a:fld id="{53E5EB77-C26E-4EBD-A5F2-B8063B5F6528}" type="datetimeFigureOut">
               <a:rPr lang="en-GB" smtClean="0"/>
-              <a:t>27/06/2021</a:t>
+              <a:t>04/07/2021</a:t>
             </a:fld>
             <a:endParaRPr lang="en-GB"/>
           </a:p>
@@ -1825,7 +1830,7 @@
           <a:p>
             <a:fld id="{53E5EB77-C26E-4EBD-A5F2-B8063B5F6528}" type="datetimeFigureOut">
               <a:rPr lang="en-GB" smtClean="0"/>
-              <a:t>27/06/2021</a:t>
+              <a:t>04/07/2021</a:t>
             </a:fld>
             <a:endParaRPr lang="en-GB"/>
           </a:p>
@@ -1967,7 +1972,7 @@
           <a:p>
             <a:fld id="{53E5EB77-C26E-4EBD-A5F2-B8063B5F6528}" type="datetimeFigureOut">
               <a:rPr lang="en-GB" smtClean="0"/>
-              <a:t>27/06/2021</a:t>
+              <a:t>04/07/2021</a:t>
             </a:fld>
             <a:endParaRPr lang="en-GB"/>
           </a:p>
@@ -2080,7 +2085,7 @@
           <a:p>
             <a:fld id="{53E5EB77-C26E-4EBD-A5F2-B8063B5F6528}" type="datetimeFigureOut">
               <a:rPr lang="en-GB" smtClean="0"/>
-              <a:t>27/06/2021</a:t>
+              <a:t>04/07/2021</a:t>
             </a:fld>
             <a:endParaRPr lang="en-GB"/>
           </a:p>
@@ -2393,7 +2398,7 @@
           <a:p>
             <a:fld id="{53E5EB77-C26E-4EBD-A5F2-B8063B5F6528}" type="datetimeFigureOut">
               <a:rPr lang="en-GB" smtClean="0"/>
-              <a:t>27/06/2021</a:t>
+              <a:t>04/07/2021</a:t>
             </a:fld>
             <a:endParaRPr lang="en-GB"/>
           </a:p>
@@ -2682,7 +2687,7 @@
           <a:p>
             <a:fld id="{53E5EB77-C26E-4EBD-A5F2-B8063B5F6528}" type="datetimeFigureOut">
               <a:rPr lang="en-GB" smtClean="0"/>
-              <a:t>27/06/2021</a:t>
+              <a:t>04/07/2021</a:t>
             </a:fld>
             <a:endParaRPr lang="en-GB"/>
           </a:p>
@@ -2925,7 +2930,7 @@
           <a:p>
             <a:fld id="{53E5EB77-C26E-4EBD-A5F2-B8063B5F6528}" type="datetimeFigureOut">
               <a:rPr lang="en-GB" smtClean="0"/>
-              <a:t>27/06/2021</a:t>
+              <a:t>04/07/2021</a:t>
             </a:fld>
             <a:endParaRPr lang="en-GB"/>
           </a:p>
@@ -3344,43 +3349,6 @@
       </p:grpSpPr>
       <p:sp>
         <p:nvSpPr>
-          <p:cNvPr id="4" name="TextBox 3">
-            <a:extLst>
-              <a:ext uri="{FF2B5EF4-FFF2-40B4-BE49-F238E27FC236}">
-                <a16:creationId xmlns:a16="http://schemas.microsoft.com/office/drawing/2014/main" id="{BC43CD7F-5768-41C5-B399-3D99915E3AC4}"/>
-              </a:ext>
-            </a:extLst>
-          </p:cNvPr>
-          <p:cNvSpPr txBox="1"/>
-          <p:nvPr/>
-        </p:nvSpPr>
-        <p:spPr>
-          <a:xfrm>
-            <a:off x="2202145" y="372863"/>
-            <a:ext cx="7787709" cy="1569660"/>
-          </a:xfrm>
-          <a:prstGeom prst="rect">
-            <a:avLst/>
-          </a:prstGeom>
-          <a:noFill/>
-        </p:spPr>
-        <p:txBody>
-          <a:bodyPr wrap="none" rtlCol="0">
-            <a:spAutoFit/>
-          </a:bodyPr>
-          <a:lstStyle/>
-          <a:p>
-            <a:r>
-              <a:rPr lang="en-GB" sz="9600" dirty="0">
-                <a:latin typeface="Broadway" panose="04040905080B02020502" pitchFamily="82" charset="0"/>
-              </a:rPr>
-              <a:t>OLIGOPOLY</a:t>
-            </a:r>
-          </a:p>
-        </p:txBody>
-      </p:sp>
-      <p:sp>
-        <p:nvSpPr>
           <p:cNvPr id="5" name="TextBox 4">
             <a:extLst>
               <a:ext uri="{FF2B5EF4-FFF2-40B4-BE49-F238E27FC236}">
@@ -3445,6 +3413,43 @@
             <a:r>
               <a:rPr lang="en-GB" sz="4400" dirty="0"/>
               <a:t>Settings</a:t>
+            </a:r>
+          </a:p>
+        </p:txBody>
+      </p:sp>
+      <p:sp>
+        <p:nvSpPr>
+          <p:cNvPr id="8" name="TextBox 7">
+            <a:extLst>
+              <a:ext uri="{FF2B5EF4-FFF2-40B4-BE49-F238E27FC236}">
+                <a16:creationId xmlns:a16="http://schemas.microsoft.com/office/drawing/2014/main" id="{F93E82A4-3174-4435-BAFC-E3BC2474DFC4}"/>
+              </a:ext>
+            </a:extLst>
+          </p:cNvPr>
+          <p:cNvSpPr txBox="1"/>
+          <p:nvPr/>
+        </p:nvSpPr>
+        <p:spPr>
+          <a:xfrm>
+            <a:off x="3461985" y="1145023"/>
+            <a:ext cx="5417855" cy="1107996"/>
+          </a:xfrm>
+          <a:prstGeom prst="rect">
+            <a:avLst/>
+          </a:prstGeom>
+          <a:noFill/>
+        </p:spPr>
+        <p:txBody>
+          <a:bodyPr wrap="square" rtlCol="0">
+            <a:spAutoFit/>
+          </a:bodyPr>
+          <a:lstStyle/>
+          <a:p>
+            <a:r>
+              <a:rPr lang="en-GB" sz="6600" dirty="0">
+                <a:latin typeface="Broadway" panose="04040905080B02020502" pitchFamily="82" charset="0"/>
+              </a:rPr>
+              <a:t>OLIGOPOLY</a:t>
             </a:r>
           </a:p>
         </p:txBody>

</xml_diff>